<commit_message>
avalue impact heatmap label
</commit_message>
<xml_diff>
--- a/ErrorVis.pptx
+++ b/ErrorVis.pptx
@@ -9413,7 +9413,7 @@
               <a:graphicData uri="http://schemas.openxmlformats.org/presentationml/2006/ole">
                 <mc:AlternateContent xmlns:mc="http://schemas.openxmlformats.org/markup-compatibility/2006">
                   <mc:Choice xmlns:v="urn:schemas-microsoft-com:vml" Requires="v">
-                    <p:oleObj spid="_x0000_s1232" name="Image" r:id="rId10" imgW="1828440" imgH="1117440" progId="Photoshop.Image.13">
+                    <p:oleObj spid="_x0000_s1236" name="Image" r:id="rId10" imgW="1828440" imgH="1117440" progId="Photoshop.Image.13">
                       <p:embed/>
                     </p:oleObj>
                   </mc:Choice>
@@ -9470,7 +9470,7 @@
               <a:graphicData uri="http://schemas.openxmlformats.org/presentationml/2006/ole">
                 <mc:AlternateContent xmlns:mc="http://schemas.openxmlformats.org/markup-compatibility/2006">
                   <mc:Choice xmlns:v="urn:schemas-microsoft-com:vml" Requires="v">
-                    <p:oleObj spid="_x0000_s1233" name="Image" r:id="rId12" imgW="1828440" imgH="1117440" progId="Photoshop.Image.13">
+                    <p:oleObj spid="_x0000_s1237" name="Image" r:id="rId12" imgW="1828440" imgH="1117440" progId="Photoshop.Image.13">
                       <p:embed/>
                     </p:oleObj>
                   </mc:Choice>
@@ -10598,7 +10598,7 @@
             <a:graphicData uri="http://schemas.openxmlformats.org/presentationml/2006/ole">
               <mc:AlternateContent xmlns:mc="http://schemas.openxmlformats.org/markup-compatibility/2006">
                 <mc:Choice xmlns:v="urn:schemas-microsoft-com:vml" Requires="v">
-                  <p:oleObj spid="_x0000_s1234" name="Image" r:id="rId14" imgW="4571280" imgH="1688760" progId="Photoshop.Image.13">
+                  <p:oleObj spid="_x0000_s1238" name="Image" r:id="rId14" imgW="4571280" imgH="1688760" progId="Photoshop.Image.13">
                     <p:embed/>
                   </p:oleObj>
                 </mc:Choice>
@@ -10682,7 +10682,7 @@
             <a:graphicData uri="http://schemas.openxmlformats.org/presentationml/2006/ole">
               <mc:AlternateContent xmlns:mc="http://schemas.openxmlformats.org/markup-compatibility/2006">
                 <mc:Choice xmlns:v="urn:schemas-microsoft-com:vml" Requires="v">
-                  <p:oleObj spid="_x0000_s1235" name="Image" r:id="rId17" imgW="1574280" imgH="1053720" progId="Photoshop.Image.13">
+                  <p:oleObj spid="_x0000_s1239" name="Image" r:id="rId17" imgW="1574280" imgH="1053720" progId="Photoshop.Image.13">
                     <p:embed/>
                   </p:oleObj>
                 </mc:Choice>
@@ -12681,7 +12681,7 @@
             <a:graphicData uri="http://schemas.openxmlformats.org/presentationml/2006/ole">
               <mc:AlternateContent xmlns:mc="http://schemas.openxmlformats.org/markup-compatibility/2006">
                 <mc:Choice xmlns:v="urn:schemas-microsoft-com:vml" Requires="v">
-                  <p:oleObj spid="_x0000_s2276" name="Image" r:id="rId5" imgW="4571280" imgH="1688760" progId="Photoshop.Image.13">
+                  <p:oleObj spid="_x0000_s2280" name="Image" r:id="rId5" imgW="4571280" imgH="1688760" progId="Photoshop.Image.13">
                     <p:embed/>
                   </p:oleObj>
                 </mc:Choice>
@@ -12765,7 +12765,7 @@
             <a:graphicData uri="http://schemas.openxmlformats.org/presentationml/2006/ole">
               <mc:AlternateContent xmlns:mc="http://schemas.openxmlformats.org/markup-compatibility/2006">
                 <mc:Choice xmlns:v="urn:schemas-microsoft-com:vml" Requires="v">
-                  <p:oleObj spid="_x0000_s2277" name="Image" r:id="rId8" imgW="1574280" imgH="1053720" progId="Photoshop.Image.13">
+                  <p:oleObj spid="_x0000_s2281" name="Image" r:id="rId8" imgW="1574280" imgH="1053720" progId="Photoshop.Image.13">
                     <p:embed/>
                   </p:oleObj>
                 </mc:Choice>
@@ -14305,7 +14305,7 @@
               <a:graphicData uri="http://schemas.openxmlformats.org/presentationml/2006/ole">
                 <mc:AlternateContent xmlns:mc="http://schemas.openxmlformats.org/markup-compatibility/2006">
                   <mc:Choice xmlns:v="urn:schemas-microsoft-com:vml" Requires="v">
-                    <p:oleObj spid="_x0000_s2278" name="Image" r:id="rId16" imgW="1828440" imgH="1117440" progId="Photoshop.Image.13">
+                    <p:oleObj spid="_x0000_s2282" name="Image" r:id="rId16" imgW="1828440" imgH="1117440" progId="Photoshop.Image.13">
                       <p:embed/>
                     </p:oleObj>
                   </mc:Choice>
@@ -14362,7 +14362,7 @@
               <a:graphicData uri="http://schemas.openxmlformats.org/presentationml/2006/ole">
                 <mc:AlternateContent xmlns:mc="http://schemas.openxmlformats.org/markup-compatibility/2006">
                   <mc:Choice xmlns:v="urn:schemas-microsoft-com:vml" Requires="v">
-                    <p:oleObj spid="_x0000_s2279" name="Image" r:id="rId18" imgW="1828440" imgH="1117440" progId="Photoshop.Image.13">
+                    <p:oleObj spid="_x0000_s2283" name="Image" r:id="rId18" imgW="1828440" imgH="1117440" progId="Photoshop.Image.13">
                       <p:embed/>
                     </p:oleObj>
                   </mc:Choice>
@@ -16191,7 +16191,7 @@
             <a:graphicData uri="http://schemas.openxmlformats.org/presentationml/2006/ole">
               <mc:AlternateContent xmlns:mc="http://schemas.openxmlformats.org/markup-compatibility/2006">
                 <mc:Choice xmlns:v="urn:schemas-microsoft-com:vml" Requires="v">
-                  <p:oleObj spid="_x0000_s3280" name="Image" r:id="rId5" imgW="4571280" imgH="1688760" progId="Photoshop.Image.13">
+                  <p:oleObj spid="_x0000_s3284" name="Image" r:id="rId5" imgW="4571280" imgH="1688760" progId="Photoshop.Image.13">
                     <p:embed/>
                   </p:oleObj>
                 </mc:Choice>
@@ -16275,7 +16275,7 @@
             <a:graphicData uri="http://schemas.openxmlformats.org/presentationml/2006/ole">
               <mc:AlternateContent xmlns:mc="http://schemas.openxmlformats.org/markup-compatibility/2006">
                 <mc:Choice xmlns:v="urn:schemas-microsoft-com:vml" Requires="v">
-                  <p:oleObj spid="_x0000_s3281" name="Image" r:id="rId8" imgW="1574280" imgH="1053720" progId="Photoshop.Image.13">
+                  <p:oleObj spid="_x0000_s3285" name="Image" r:id="rId8" imgW="1574280" imgH="1053720" progId="Photoshop.Image.13">
                     <p:embed/>
                   </p:oleObj>
                 </mc:Choice>
@@ -17815,7 +17815,7 @@
               <a:graphicData uri="http://schemas.openxmlformats.org/presentationml/2006/ole">
                 <mc:AlternateContent xmlns:mc="http://schemas.openxmlformats.org/markup-compatibility/2006">
                   <mc:Choice xmlns:v="urn:schemas-microsoft-com:vml" Requires="v">
-                    <p:oleObj spid="_x0000_s3282" name="Image" r:id="rId16" imgW="1828440" imgH="1117440" progId="Photoshop.Image.13">
+                    <p:oleObj spid="_x0000_s3286" name="Image" r:id="rId16" imgW="1828440" imgH="1117440" progId="Photoshop.Image.13">
                       <p:embed/>
                     </p:oleObj>
                   </mc:Choice>
@@ -17872,7 +17872,7 @@
               <a:graphicData uri="http://schemas.openxmlformats.org/presentationml/2006/ole">
                 <mc:AlternateContent xmlns:mc="http://schemas.openxmlformats.org/markup-compatibility/2006">
                   <mc:Choice xmlns:v="urn:schemas-microsoft-com:vml" Requires="v">
-                    <p:oleObj spid="_x0000_s3283" name="Image" r:id="rId18" imgW="1828440" imgH="1117440" progId="Photoshop.Image.13">
+                    <p:oleObj spid="_x0000_s3287" name="Image" r:id="rId18" imgW="1828440" imgH="1117440" progId="Photoshop.Image.13">
                       <p:embed/>
                     </p:oleObj>
                   </mc:Choice>
@@ -20567,8 +20567,8 @@
         </p:blipFill>
         <p:spPr>
           <a:xfrm>
-            <a:off x="13850352" y="7722806"/>
-            <a:ext cx="5398597" cy="4973729"/>
+            <a:off x="13509156" y="7334604"/>
+            <a:ext cx="5819960" cy="5361931"/>
           </a:xfrm>
           <a:prstGeom prst="rect">
             <a:avLst/>

</xml_diff>